<commit_message>
fixed mistakes in conditional statements
</commit_message>
<xml_diff>
--- a/Week1/01-python - intro, type, control flow.pptx
+++ b/Week1/01-python - intro, type, control flow.pptx
@@ -367,7 +367,7 @@
               <a:pPr>
                 <a:defRPr/>
               </a:pPr>
-              <a:t>7/14/2021</a:t>
+              <a:t>8/19/21</a:t>
             </a:fld>
             <a:endParaRPr lang="en-US"/>
           </a:p>
@@ -789,7 +789,7 @@
               <a:pPr>
                 <a:defRPr/>
               </a:pPr>
-              <a:t>14-Jul-21</a:t>
+              <a:t>19-Aug-21</a:t>
             </a:fld>
             <a:endParaRPr lang="en-US"/>
           </a:p>
@@ -965,7 +965,7 @@
               <a:pPr>
                 <a:defRPr/>
               </a:pPr>
-              <a:t>14-Jul-21</a:t>
+              <a:t>19-Aug-21</a:t>
             </a:fld>
             <a:endParaRPr lang="en-US"/>
           </a:p>
@@ -1183,7 +1183,7 @@
               <a:pPr>
                 <a:defRPr/>
               </a:pPr>
-              <a:t>14-Jul-21</a:t>
+              <a:t>19-Aug-21</a:t>
             </a:fld>
             <a:endParaRPr lang="en-US"/>
           </a:p>
@@ -1416,7 +1416,7 @@
               <a:pPr>
                 <a:defRPr/>
               </a:pPr>
-              <a:t>14-Jul-21</a:t>
+              <a:t>19-Aug-21</a:t>
             </a:fld>
             <a:endParaRPr lang="en-US"/>
           </a:p>
@@ -1647,7 +1647,7 @@
               <a:pPr>
                 <a:defRPr/>
               </a:pPr>
-              <a:t>14-Jul-21</a:t>
+              <a:t>19-Aug-21</a:t>
             </a:fld>
             <a:endParaRPr lang="en-US"/>
           </a:p>
@@ -1916,7 +1916,7 @@
               <a:pPr>
                 <a:defRPr/>
               </a:pPr>
-              <a:t>14-Jul-21</a:t>
+              <a:t>19-Aug-21</a:t>
             </a:fld>
             <a:endParaRPr lang="en-US"/>
           </a:p>
@@ -2320,7 +2320,7 @@
               <a:pPr>
                 <a:defRPr/>
               </a:pPr>
-              <a:t>14-Jul-21</a:t>
+              <a:t>19-Aug-21</a:t>
             </a:fld>
             <a:endParaRPr lang="en-US"/>
           </a:p>
@@ -2475,7 +2475,7 @@
               <a:pPr>
                 <a:defRPr/>
               </a:pPr>
-              <a:t>14-Jul-21</a:t>
+              <a:t>19-Aug-21</a:t>
             </a:fld>
             <a:endParaRPr lang="en-US"/>
           </a:p>
@@ -2609,7 +2609,7 @@
               <a:pPr>
                 <a:defRPr/>
               </a:pPr>
-              <a:t>14-Jul-21</a:t>
+              <a:t>19-Aug-21</a:t>
             </a:fld>
             <a:endParaRPr lang="en-US"/>
           </a:p>
@@ -2924,7 +2924,7 @@
               <a:pPr>
                 <a:defRPr/>
               </a:pPr>
-              <a:t>14-Jul-21</a:t>
+              <a:t>19-Aug-21</a:t>
             </a:fld>
             <a:endParaRPr lang="en-US"/>
           </a:p>
@@ -3217,7 +3217,7 @@
               <a:pPr>
                 <a:defRPr/>
               </a:pPr>
-              <a:t>14-Jul-21</a:t>
+              <a:t>19-Aug-21</a:t>
             </a:fld>
             <a:endParaRPr lang="en-US"/>
           </a:p>
@@ -3539,7 +3539,7 @@
               <a:pPr>
                 <a:defRPr/>
               </a:pPr>
-              <a:t>14-Jul-21</a:t>
+              <a:t>19-Aug-21</a:t>
             </a:fld>
             <a:endParaRPr lang="en-US"/>
           </a:p>
@@ -12381,7 +12381,7 @@
                 <a:latin typeface="Courier New" panose="02070309020205020404" pitchFamily="49" charset="0"/>
                 <a:cs typeface="Courier New" panose="02070309020205020404" pitchFamily="49" charset="0"/>
               </a:rPr>
-              <a:t>(x == y) is false</a:t>
+              <a:t>(x == y) is False</a:t>
             </a:r>
             <a:endParaRPr lang="en-US" sz="1600" dirty="0">
               <a:latin typeface="Arial" panose="020B0604020202020204" pitchFamily="34" charset="0"/>
@@ -12451,7 +12451,7 @@
                 <a:latin typeface="Courier New" panose="02070309020205020404" pitchFamily="49" charset="0"/>
                 <a:cs typeface="Courier New" panose="02070309020205020404" pitchFamily="49" charset="0"/>
               </a:rPr>
-              <a:t>(x != y) is true</a:t>
+              <a:t>(x != y) is True</a:t>
             </a:r>
           </a:p>
           <a:p>
@@ -12469,7 +12469,7 @@
                 <a:latin typeface="Courier New" panose="02070309020205020404" pitchFamily="49" charset="0"/>
                 <a:cs typeface="Courier New" panose="02070309020205020404" pitchFamily="49" charset="0"/>
               </a:rPr>
-              <a:t>(x &gt; y) is false.</a:t>
+              <a:t>(x &gt; y) is False.</a:t>
             </a:r>
           </a:p>
           <a:p>
@@ -12487,7 +12487,7 @@
                 <a:latin typeface="Courier New" panose="02070309020205020404" pitchFamily="49" charset="0"/>
                 <a:cs typeface="Courier New" panose="02070309020205020404" pitchFamily="49" charset="0"/>
               </a:rPr>
-              <a:t>(x &lt; y) is true.</a:t>
+              <a:t>(x &lt; y) is True.</a:t>
             </a:r>
           </a:p>
           <a:p>
@@ -12505,7 +12505,7 @@
                 <a:latin typeface="Courier New" panose="02070309020205020404" pitchFamily="49" charset="0"/>
                 <a:cs typeface="Courier New" panose="02070309020205020404" pitchFamily="49" charset="0"/>
               </a:rPr>
-              <a:t>(x &lt;= y) is true</a:t>
+              <a:t>(x &lt;= y) is True</a:t>
             </a:r>
           </a:p>
           <a:p>
@@ -13542,7 +13542,7 @@
             </a:pPr>
             <a:r>
               <a:rPr lang="es-ES" altLang="en-US" sz="1400" b="1" dirty="0"/>
-              <a:t>    &gt;&gt;&gt;true</a:t>
+              <a:t>    &gt;&gt;&gt;True</a:t>
             </a:r>
           </a:p>
         </p:txBody>
@@ -14797,7 +14797,7 @@
             </a:pPr>
             <a:r>
               <a:rPr lang="es-ES" altLang="en-US" sz="1400" b="1" dirty="0"/>
-              <a:t>    &gt;&gt;&gt;true</a:t>
+              <a:t>    &gt;&gt;&gt;True</a:t>
             </a:r>
           </a:p>
         </p:txBody>
@@ -15040,7 +15040,7 @@
             </a:pPr>
             <a:r>
               <a:rPr lang="es-ES" altLang="en-US" sz="1400" b="1" dirty="0"/>
-              <a:t>    &gt;&gt;&gt;true</a:t>
+              <a:t>    &gt;&gt;&gt;True</a:t>
             </a:r>
           </a:p>
         </p:txBody>
@@ -21589,11 +21589,11 @@
               <a:t>i.e</a:t>
             </a:r>
             <a:r>
-              <a:rPr lang="en-US" altLang="en-US" sz="1600" dirty="0">
-                <a:latin typeface="Arial" panose="020B0604020202020204" pitchFamily="34" charset="0"/>
-                <a:cs typeface="Arial" panose="020B0604020202020204" pitchFamily="34" charset="0"/>
-              </a:rPr>
-              <a:t>: true, false</a:t>
+              <a:rPr lang="en-US" altLang="en-US" sz="1600">
+                <a:latin typeface="Arial" panose="020B0604020202020204" pitchFamily="34" charset="0"/>
+                <a:cs typeface="Arial" panose="020B0604020202020204" pitchFamily="34" charset="0"/>
+              </a:rPr>
+              <a:t>: True, False</a:t>
             </a:r>
             <a:br>
               <a:rPr lang="en-US" altLang="en-US" sz="1600" i="1" dirty="0">

</xml_diff>